<commit_message>
added a second media file to css, edited presentation, cleaned code
</commit_message>
<xml_diff>
--- a/Project Presentation.pptx
+++ b/Project Presentation.pptx
@@ -113,6 +113,11 @@
       </a:defRPr>
     </a:lvl9pPr>
   </p:defaultTextStyle>
+  <p:extLst>
+    <p:ext uri="{EFAFB233-063F-42B5-8137-9DF3F51BA10A}">
+      <p15:sldGuideLst xmlns:p15="http://schemas.microsoft.com/office/powerpoint/2012/main"/>
+    </p:ext>
+  </p:extLst>
 </p:presentation>
 </file>
 
@@ -1335,7 +1340,7 @@
           <a:noFill/>
           <a:extLst>
             <a:ext uri="{909E8E84-426E-40dd-AFC4-6F175D3DCCD1}">
-              <a14:hiddenFill xmlns:a14="http://schemas.microsoft.com/office/drawing/2010/main" xmlns="">
+              <a14:hiddenFill xmlns="" xmlns:a14="http://schemas.microsoft.com/office/drawing/2010/main">
                 <a:solidFill>
                   <a:srgbClr val="FFFFFF"/>
                 </a:solidFill>
@@ -1395,7 +1400,7 @@
             </a:ln>
             <a:extLst>
               <a:ext uri="{91240B29-F687-4f45-9708-019B960494DF}">
-                <a14:hiddenLine xmlns:a14="http://schemas.microsoft.com/office/drawing/2010/main" xmlns="" w="9525">
+                <a14:hiddenLine xmlns="" xmlns:a14="http://schemas.microsoft.com/office/drawing/2010/main" w="9525">
                   <a:solidFill>
                     <a:srgbClr val="000000"/>
                   </a:solidFill>
@@ -1485,7 +1490,7 @@
             </a:ln>
             <a:extLst>
               <a:ext uri="{91240B29-F687-4f45-9708-019B960494DF}">
-                <a14:hiddenLine xmlns:a14="http://schemas.microsoft.com/office/drawing/2010/main" xmlns="" w="9525">
+                <a14:hiddenLine xmlns="" xmlns:a14="http://schemas.microsoft.com/office/drawing/2010/main" w="9525">
                   <a:solidFill>
                     <a:srgbClr val="000000"/>
                   </a:solidFill>
@@ -1575,7 +1580,7 @@
             </a:ln>
             <a:extLst>
               <a:ext uri="{91240B29-F687-4f45-9708-019B960494DF}">
-                <a14:hiddenLine xmlns:a14="http://schemas.microsoft.com/office/drawing/2010/main" xmlns="" w="9525">
+                <a14:hiddenLine xmlns="" xmlns:a14="http://schemas.microsoft.com/office/drawing/2010/main" w="9525">
                   <a:solidFill>
                     <a:srgbClr val="000000"/>
                   </a:solidFill>
@@ -1609,7 +1614,7 @@
             </a:ln>
             <a:extLst>
               <a:ext uri="{91240B29-F687-4f45-9708-019B960494DF}">
-                <a14:hiddenLine xmlns:a14="http://schemas.microsoft.com/office/drawing/2010/main" xmlns="" w="9525">
+                <a14:hiddenLine xmlns="" xmlns:a14="http://schemas.microsoft.com/office/drawing/2010/main" w="9525">
                   <a:solidFill>
                     <a:srgbClr val="000000"/>
                   </a:solidFill>
@@ -1699,7 +1704,7 @@
             </a:ln>
             <a:extLst>
               <a:ext uri="{91240B29-F687-4f45-9708-019B960494DF}">
-                <a14:hiddenLine xmlns:a14="http://schemas.microsoft.com/office/drawing/2010/main" xmlns="" w="9525">
+                <a14:hiddenLine xmlns="" xmlns:a14="http://schemas.microsoft.com/office/drawing/2010/main" w="9525">
                   <a:solidFill>
                     <a:srgbClr val="000000"/>
                   </a:solidFill>
@@ -1761,7 +1766,7 @@
             </a:ln>
             <a:extLst>
               <a:ext uri="{91240B29-F687-4f45-9708-019B960494DF}">
-                <a14:hiddenLine xmlns:a14="http://schemas.microsoft.com/office/drawing/2010/main" xmlns="" w="9525">
+                <a14:hiddenLine xmlns="" xmlns:a14="http://schemas.microsoft.com/office/drawing/2010/main" w="9525">
                   <a:solidFill>
                     <a:srgbClr val="000000"/>
                   </a:solidFill>
@@ -1823,7 +1828,7 @@
             </a:ln>
             <a:extLst>
               <a:ext uri="{91240B29-F687-4f45-9708-019B960494DF}">
-                <a14:hiddenLine xmlns:a14="http://schemas.microsoft.com/office/drawing/2010/main" xmlns="" w="9525">
+                <a14:hiddenLine xmlns="" xmlns:a14="http://schemas.microsoft.com/office/drawing/2010/main" w="9525">
                   <a:solidFill>
                     <a:srgbClr val="000000"/>
                   </a:solidFill>
@@ -1913,7 +1918,7 @@
             </a:ln>
             <a:extLst>
               <a:ext uri="{91240B29-F687-4f45-9708-019B960494DF}">
-                <a14:hiddenLine xmlns:a14="http://schemas.microsoft.com/office/drawing/2010/main" xmlns="" w="9525">
+                <a14:hiddenLine xmlns="" xmlns:a14="http://schemas.microsoft.com/office/drawing/2010/main" w="9525">
                   <a:solidFill>
                     <a:srgbClr val="000000"/>
                   </a:solidFill>
@@ -1975,7 +1980,7 @@
             </a:ln>
             <a:extLst>
               <a:ext uri="{91240B29-F687-4f45-9708-019B960494DF}">
-                <a14:hiddenLine xmlns:a14="http://schemas.microsoft.com/office/drawing/2010/main" xmlns="" w="9525">
+                <a14:hiddenLine xmlns="" xmlns:a14="http://schemas.microsoft.com/office/drawing/2010/main" w="9525">
                   <a:solidFill>
                     <a:srgbClr val="000000"/>
                   </a:solidFill>
@@ -2037,7 +2042,7 @@
             </a:ln>
             <a:extLst>
               <a:ext uri="{91240B29-F687-4f45-9708-019B960494DF}">
-                <a14:hiddenLine xmlns:a14="http://schemas.microsoft.com/office/drawing/2010/main" xmlns="" w="9525">
+                <a14:hiddenLine xmlns="" xmlns:a14="http://schemas.microsoft.com/office/drawing/2010/main" w="9525">
                   <a:solidFill>
                     <a:srgbClr val="000000"/>
                   </a:solidFill>
@@ -2127,7 +2132,7 @@
             </a:ln>
             <a:extLst>
               <a:ext uri="{91240B29-F687-4f45-9708-019B960494DF}">
-                <a14:hiddenLine xmlns:a14="http://schemas.microsoft.com/office/drawing/2010/main" xmlns="" w="9525">
+                <a14:hiddenLine xmlns="" xmlns:a14="http://schemas.microsoft.com/office/drawing/2010/main" w="9525">
                   <a:solidFill>
                     <a:srgbClr val="000000"/>
                   </a:solidFill>
@@ -2217,7 +2222,7 @@
             </a:ln>
             <a:extLst>
               <a:ext uri="{91240B29-F687-4f45-9708-019B960494DF}">
-                <a14:hiddenLine xmlns:a14="http://schemas.microsoft.com/office/drawing/2010/main" xmlns="" w="9525">
+                <a14:hiddenLine xmlns="" xmlns:a14="http://schemas.microsoft.com/office/drawing/2010/main" w="9525">
                   <a:solidFill>
                     <a:srgbClr val="000000"/>
                   </a:solidFill>
@@ -2279,7 +2284,7 @@
             </a:ln>
             <a:extLst>
               <a:ext uri="{91240B29-F687-4f45-9708-019B960494DF}">
-                <a14:hiddenLine xmlns:a14="http://schemas.microsoft.com/office/drawing/2010/main" xmlns="" w="9525">
+                <a14:hiddenLine xmlns="" xmlns:a14="http://schemas.microsoft.com/office/drawing/2010/main" w="9525">
                   <a:solidFill>
                     <a:srgbClr val="000000"/>
                   </a:solidFill>
@@ -2389,7 +2394,7 @@
             </a:ln>
             <a:extLst>
               <a:ext uri="{91240B29-F687-4f45-9708-019B960494DF}">
-                <a14:hiddenLine xmlns:a14="http://schemas.microsoft.com/office/drawing/2010/main" xmlns="" w="9525">
+                <a14:hiddenLine xmlns="" xmlns:a14="http://schemas.microsoft.com/office/drawing/2010/main" w="9525">
                   <a:solidFill>
                     <a:srgbClr val="000000"/>
                   </a:solidFill>
@@ -2451,7 +2456,7 @@
             </a:ln>
             <a:extLst>
               <a:ext uri="{91240B29-F687-4f45-9708-019B960494DF}">
-                <a14:hiddenLine xmlns:a14="http://schemas.microsoft.com/office/drawing/2010/main" xmlns="" w="9525">
+                <a14:hiddenLine xmlns="" xmlns:a14="http://schemas.microsoft.com/office/drawing/2010/main" w="9525">
                   <a:solidFill>
                     <a:srgbClr val="000000"/>
                   </a:solidFill>
@@ -2541,7 +2546,7 @@
             </a:ln>
             <a:extLst>
               <a:ext uri="{91240B29-F687-4f45-9708-019B960494DF}">
-                <a14:hiddenLine xmlns:a14="http://schemas.microsoft.com/office/drawing/2010/main" xmlns="" w="9525">
+                <a14:hiddenLine xmlns="" xmlns:a14="http://schemas.microsoft.com/office/drawing/2010/main" w="9525">
                   <a:solidFill>
                     <a:srgbClr val="000000"/>
                   </a:solidFill>
@@ -2631,7 +2636,7 @@
             </a:ln>
             <a:extLst>
               <a:ext uri="{91240B29-F687-4f45-9708-019B960494DF}">
-                <a14:hiddenLine xmlns:a14="http://schemas.microsoft.com/office/drawing/2010/main" xmlns="" w="9525">
+                <a14:hiddenLine xmlns="" xmlns:a14="http://schemas.microsoft.com/office/drawing/2010/main" w="9525">
                   <a:solidFill>
                     <a:srgbClr val="000000"/>
                   </a:solidFill>
@@ -2693,7 +2698,7 @@
             </a:ln>
             <a:extLst>
               <a:ext uri="{91240B29-F687-4f45-9708-019B960494DF}">
-                <a14:hiddenLine xmlns:a14="http://schemas.microsoft.com/office/drawing/2010/main" xmlns="" w="9525">
+                <a14:hiddenLine xmlns="" xmlns:a14="http://schemas.microsoft.com/office/drawing/2010/main" w="9525">
                   <a:solidFill>
                     <a:srgbClr val="000000"/>
                   </a:solidFill>
@@ -2783,7 +2788,7 @@
             </a:ln>
             <a:extLst>
               <a:ext uri="{91240B29-F687-4f45-9708-019B960494DF}">
-                <a14:hiddenLine xmlns:a14="http://schemas.microsoft.com/office/drawing/2010/main" xmlns="" w="9525">
+                <a14:hiddenLine xmlns="" xmlns:a14="http://schemas.microsoft.com/office/drawing/2010/main" w="9525">
                   <a:solidFill>
                     <a:srgbClr val="000000"/>
                   </a:solidFill>
@@ -2873,7 +2878,7 @@
             </a:ln>
             <a:extLst>
               <a:ext uri="{91240B29-F687-4f45-9708-019B960494DF}">
-                <a14:hiddenLine xmlns:a14="http://schemas.microsoft.com/office/drawing/2010/main" xmlns="" w="9525">
+                <a14:hiddenLine xmlns="" xmlns:a14="http://schemas.microsoft.com/office/drawing/2010/main" w="9525">
                   <a:solidFill>
                     <a:srgbClr val="000000"/>
                   </a:solidFill>
@@ -2929,7 +2934,7 @@
             </a:ln>
             <a:extLst>
               <a:ext uri="{91240B29-F687-4f45-9708-019B960494DF}">
-                <a14:hiddenLine xmlns:a14="http://schemas.microsoft.com/office/drawing/2010/main" xmlns="" w="9525">
+                <a14:hiddenLine xmlns="" xmlns:a14="http://schemas.microsoft.com/office/drawing/2010/main" w="9525">
                   <a:solidFill>
                     <a:srgbClr val="000000"/>
                   </a:solidFill>
@@ -3019,7 +3024,7 @@
             </a:ln>
             <a:extLst>
               <a:ext uri="{91240B29-F687-4f45-9708-019B960494DF}">
-                <a14:hiddenLine xmlns:a14="http://schemas.microsoft.com/office/drawing/2010/main" xmlns="" w="9525">
+                <a14:hiddenLine xmlns="" xmlns:a14="http://schemas.microsoft.com/office/drawing/2010/main" w="9525">
                   <a:solidFill>
                     <a:srgbClr val="000000"/>
                   </a:solidFill>
@@ -3075,7 +3080,7 @@
             </a:ln>
             <a:extLst>
               <a:ext uri="{91240B29-F687-4f45-9708-019B960494DF}">
-                <a14:hiddenLine xmlns:a14="http://schemas.microsoft.com/office/drawing/2010/main" xmlns="" w="9525">
+                <a14:hiddenLine xmlns="" xmlns:a14="http://schemas.microsoft.com/office/drawing/2010/main" w="9525">
                   <a:solidFill>
                     <a:srgbClr val="000000"/>
                   </a:solidFill>
@@ -3165,7 +3170,7 @@
             </a:ln>
             <a:extLst>
               <a:ext uri="{91240B29-F687-4f45-9708-019B960494DF}">
-                <a14:hiddenLine xmlns:a14="http://schemas.microsoft.com/office/drawing/2010/main" xmlns="" w="9525">
+                <a14:hiddenLine xmlns="" xmlns:a14="http://schemas.microsoft.com/office/drawing/2010/main" w="9525">
                   <a:solidFill>
                     <a:srgbClr val="000000"/>
                   </a:solidFill>
@@ -3233,7 +3238,7 @@
             </a:ln>
             <a:extLst>
               <a:ext uri="{91240B29-F687-4f45-9708-019B960494DF}">
-                <a14:hiddenLine xmlns:a14="http://schemas.microsoft.com/office/drawing/2010/main" xmlns="" w="9525">
+                <a14:hiddenLine xmlns="" xmlns:a14="http://schemas.microsoft.com/office/drawing/2010/main" w="9525">
                   <a:solidFill>
                     <a:srgbClr val="000000"/>
                   </a:solidFill>
@@ -3323,7 +3328,7 @@
             </a:ln>
             <a:extLst>
               <a:ext uri="{91240B29-F687-4f45-9708-019B960494DF}">
-                <a14:hiddenLine xmlns:a14="http://schemas.microsoft.com/office/drawing/2010/main" xmlns="" w="9525">
+                <a14:hiddenLine xmlns="" xmlns:a14="http://schemas.microsoft.com/office/drawing/2010/main" w="9525">
                   <a:solidFill>
                     <a:srgbClr val="000000"/>
                   </a:solidFill>
@@ -3391,7 +3396,7 @@
             </a:ln>
             <a:extLst>
               <a:ext uri="{91240B29-F687-4f45-9708-019B960494DF}">
-                <a14:hiddenLine xmlns:a14="http://schemas.microsoft.com/office/drawing/2010/main" xmlns="" w="9525">
+                <a14:hiddenLine xmlns="" xmlns:a14="http://schemas.microsoft.com/office/drawing/2010/main" w="9525">
                   <a:solidFill>
                     <a:srgbClr val="000000"/>
                   </a:solidFill>
@@ -3481,7 +3486,7 @@
             </a:ln>
             <a:extLst>
               <a:ext uri="{91240B29-F687-4f45-9708-019B960494DF}">
-                <a14:hiddenLine xmlns:a14="http://schemas.microsoft.com/office/drawing/2010/main" xmlns="" w="9525">
+                <a14:hiddenLine xmlns="" xmlns:a14="http://schemas.microsoft.com/office/drawing/2010/main" w="9525">
                   <a:solidFill>
                     <a:srgbClr val="000000"/>
                   </a:solidFill>
@@ -3515,7 +3520,7 @@
             </a:ln>
             <a:extLst>
               <a:ext uri="{91240B29-F687-4f45-9708-019B960494DF}">
-                <a14:hiddenLine xmlns:a14="http://schemas.microsoft.com/office/drawing/2010/main" xmlns="" w="9525">
+                <a14:hiddenLine xmlns="" xmlns:a14="http://schemas.microsoft.com/office/drawing/2010/main" w="9525">
                   <a:solidFill>
                     <a:srgbClr val="000000"/>
                   </a:solidFill>
@@ -3605,7 +3610,7 @@
             </a:ln>
             <a:extLst>
               <a:ext uri="{91240B29-F687-4f45-9708-019B960494DF}">
-                <a14:hiddenLine xmlns:a14="http://schemas.microsoft.com/office/drawing/2010/main" xmlns="" w="9525">
+                <a14:hiddenLine xmlns="" xmlns:a14="http://schemas.microsoft.com/office/drawing/2010/main" w="9525">
                   <a:solidFill>
                     <a:srgbClr val="000000"/>
                   </a:solidFill>
@@ -3667,7 +3672,7 @@
             </a:ln>
             <a:extLst>
               <a:ext uri="{91240B29-F687-4f45-9708-019B960494DF}">
-                <a14:hiddenLine xmlns:a14="http://schemas.microsoft.com/office/drawing/2010/main" xmlns="" w="9525">
+                <a14:hiddenLine xmlns="" xmlns:a14="http://schemas.microsoft.com/office/drawing/2010/main" w="9525">
                   <a:solidFill>
                     <a:srgbClr val="000000"/>
                   </a:solidFill>
@@ -3729,7 +3734,7 @@
             </a:ln>
             <a:extLst>
               <a:ext uri="{91240B29-F687-4f45-9708-019B960494DF}">
-                <a14:hiddenLine xmlns:a14="http://schemas.microsoft.com/office/drawing/2010/main" xmlns="" w="9525">
+                <a14:hiddenLine xmlns="" xmlns:a14="http://schemas.microsoft.com/office/drawing/2010/main" w="9525">
                   <a:solidFill>
                     <a:srgbClr val="000000"/>
                   </a:solidFill>
@@ -3819,7 +3824,7 @@
             </a:ln>
             <a:extLst>
               <a:ext uri="{91240B29-F687-4f45-9708-019B960494DF}">
-                <a14:hiddenLine xmlns:a14="http://schemas.microsoft.com/office/drawing/2010/main" xmlns="" w="9525">
+                <a14:hiddenLine xmlns="" xmlns:a14="http://schemas.microsoft.com/office/drawing/2010/main" w="9525">
                   <a:solidFill>
                     <a:srgbClr val="000000"/>
                   </a:solidFill>
@@ -3887,7 +3892,7 @@
             </a:ln>
             <a:extLst>
               <a:ext uri="{91240B29-F687-4f45-9708-019B960494DF}">
-                <a14:hiddenLine xmlns:a14="http://schemas.microsoft.com/office/drawing/2010/main" xmlns="" w="9525">
+                <a14:hiddenLine xmlns="" xmlns:a14="http://schemas.microsoft.com/office/drawing/2010/main" w="9525">
                   <a:solidFill>
                     <a:srgbClr val="000000"/>
                   </a:solidFill>
@@ -3949,7 +3954,7 @@
             </a:ln>
             <a:extLst>
               <a:ext uri="{91240B29-F687-4f45-9708-019B960494DF}">
-                <a14:hiddenLine xmlns:a14="http://schemas.microsoft.com/office/drawing/2010/main" xmlns="" w="9525">
+                <a14:hiddenLine xmlns="" xmlns:a14="http://schemas.microsoft.com/office/drawing/2010/main" w="9525">
                   <a:solidFill>
                     <a:srgbClr val="000000"/>
                   </a:solidFill>
@@ -4039,7 +4044,7 @@
             </a:ln>
             <a:extLst>
               <a:ext uri="{91240B29-F687-4f45-9708-019B960494DF}">
-                <a14:hiddenLine xmlns:a14="http://schemas.microsoft.com/office/drawing/2010/main" xmlns="" w="9525">
+                <a14:hiddenLine xmlns="" xmlns:a14="http://schemas.microsoft.com/office/drawing/2010/main" w="9525">
                   <a:solidFill>
                     <a:srgbClr val="000000"/>
                   </a:solidFill>
@@ -4101,7 +4106,7 @@
             </a:ln>
             <a:extLst>
               <a:ext uri="{91240B29-F687-4f45-9708-019B960494DF}">
-                <a14:hiddenLine xmlns:a14="http://schemas.microsoft.com/office/drawing/2010/main" xmlns="" w="9525">
+                <a14:hiddenLine xmlns="" xmlns:a14="http://schemas.microsoft.com/office/drawing/2010/main" w="9525">
                   <a:solidFill>
                     <a:srgbClr val="000000"/>
                   </a:solidFill>
@@ -4191,7 +4196,7 @@
             </a:ln>
             <a:extLst>
               <a:ext uri="{91240B29-F687-4f45-9708-019B960494DF}">
-                <a14:hiddenLine xmlns:a14="http://schemas.microsoft.com/office/drawing/2010/main" xmlns="" w="9525">
+                <a14:hiddenLine xmlns="" xmlns:a14="http://schemas.microsoft.com/office/drawing/2010/main" w="9525">
                   <a:solidFill>
                     <a:srgbClr val="000000"/>
                   </a:solidFill>
@@ -4253,7 +4258,7 @@
             </a:ln>
             <a:extLst>
               <a:ext uri="{91240B29-F687-4f45-9708-019B960494DF}">
-                <a14:hiddenLine xmlns:a14="http://schemas.microsoft.com/office/drawing/2010/main" xmlns="" w="9525">
+                <a14:hiddenLine xmlns="" xmlns:a14="http://schemas.microsoft.com/office/drawing/2010/main" w="9525">
                   <a:solidFill>
                     <a:srgbClr val="000000"/>
                   </a:solidFill>
@@ -4343,7 +4348,7 @@
             </a:ln>
             <a:extLst>
               <a:ext uri="{91240B29-F687-4f45-9708-019B960494DF}">
-                <a14:hiddenLine xmlns:a14="http://schemas.microsoft.com/office/drawing/2010/main" xmlns="" w="9525">
+                <a14:hiddenLine xmlns="" xmlns:a14="http://schemas.microsoft.com/office/drawing/2010/main" w="9525">
                   <a:solidFill>
                     <a:srgbClr val="000000"/>
                   </a:solidFill>
@@ -4377,7 +4382,7 @@
             </a:ln>
             <a:extLst>
               <a:ext uri="{91240B29-F687-4f45-9708-019B960494DF}">
-                <a14:hiddenLine xmlns:a14="http://schemas.microsoft.com/office/drawing/2010/main" xmlns="" w="9525">
+                <a14:hiddenLine xmlns="" xmlns:a14="http://schemas.microsoft.com/office/drawing/2010/main" w="9525">
                   <a:solidFill>
                     <a:srgbClr val="000000"/>
                   </a:solidFill>
@@ -4442,7 +4447,7 @@
             </a:ln>
             <a:extLst>
               <a:ext uri="{91240B29-F687-4f45-9708-019B960494DF}">
-                <a14:hiddenLine xmlns:a14="http://schemas.microsoft.com/office/drawing/2010/main" xmlns="" w="9525">
+                <a14:hiddenLine xmlns="" xmlns:a14="http://schemas.microsoft.com/office/drawing/2010/main" w="9525">
                   <a:solidFill>
                     <a:srgbClr val="000000"/>
                   </a:solidFill>
@@ -4532,7 +4537,7 @@
             </a:ln>
             <a:extLst>
               <a:ext uri="{91240B29-F687-4f45-9708-019B960494DF}">
-                <a14:hiddenLine xmlns:a14="http://schemas.microsoft.com/office/drawing/2010/main" xmlns="" w="9525">
+                <a14:hiddenLine xmlns="" xmlns:a14="http://schemas.microsoft.com/office/drawing/2010/main" w="9525">
                   <a:solidFill>
                     <a:srgbClr val="000000"/>
                   </a:solidFill>
@@ -4594,7 +4599,7 @@
             </a:ln>
             <a:extLst>
               <a:ext uri="{91240B29-F687-4f45-9708-019B960494DF}">
-                <a14:hiddenLine xmlns:a14="http://schemas.microsoft.com/office/drawing/2010/main" xmlns="" w="9525">
+                <a14:hiddenLine xmlns="" xmlns:a14="http://schemas.microsoft.com/office/drawing/2010/main" w="9525">
                   <a:solidFill>
                     <a:srgbClr val="000000"/>
                   </a:solidFill>
@@ -4684,7 +4689,7 @@
             </a:ln>
             <a:extLst>
               <a:ext uri="{91240B29-F687-4f45-9708-019B960494DF}">
-                <a14:hiddenLine xmlns:a14="http://schemas.microsoft.com/office/drawing/2010/main" xmlns="" w="9525">
+                <a14:hiddenLine xmlns="" xmlns:a14="http://schemas.microsoft.com/office/drawing/2010/main" w="9525">
                   <a:solidFill>
                     <a:srgbClr val="000000"/>
                   </a:solidFill>
@@ -4774,7 +4779,7 @@
             </a:ln>
             <a:extLst>
               <a:ext uri="{91240B29-F687-4f45-9708-019B960494DF}">
-                <a14:hiddenLine xmlns:a14="http://schemas.microsoft.com/office/drawing/2010/main" xmlns="" w="9525">
+                <a14:hiddenLine xmlns="" xmlns:a14="http://schemas.microsoft.com/office/drawing/2010/main" w="9525">
                   <a:solidFill>
                     <a:srgbClr val="000000"/>
                   </a:solidFill>
@@ -4839,7 +4844,7 @@
             </a:ln>
             <a:extLst>
               <a:ext uri="{91240B29-F687-4f45-9708-019B960494DF}">
-                <a14:hiddenLine xmlns:a14="http://schemas.microsoft.com/office/drawing/2010/main" xmlns="" w="9525">
+                <a14:hiddenLine xmlns="" xmlns:a14="http://schemas.microsoft.com/office/drawing/2010/main" w="9525">
                   <a:solidFill>
                     <a:srgbClr val="000000"/>
                   </a:solidFill>
@@ -4901,7 +4906,7 @@
             </a:ln>
             <a:extLst>
               <a:ext uri="{91240B29-F687-4f45-9708-019B960494DF}">
-                <a14:hiddenLine xmlns:a14="http://schemas.microsoft.com/office/drawing/2010/main" xmlns="" w="9525">
+                <a14:hiddenLine xmlns="" xmlns:a14="http://schemas.microsoft.com/office/drawing/2010/main" w="9525">
                   <a:solidFill>
                     <a:srgbClr val="000000"/>
                   </a:solidFill>
@@ -4991,7 +4996,7 @@
             </a:ln>
             <a:extLst>
               <a:ext uri="{91240B29-F687-4f45-9708-019B960494DF}">
-                <a14:hiddenLine xmlns:a14="http://schemas.microsoft.com/office/drawing/2010/main" xmlns="" w="9525">
+                <a14:hiddenLine xmlns="" xmlns:a14="http://schemas.microsoft.com/office/drawing/2010/main" w="9525">
                   <a:solidFill>
                     <a:srgbClr val="000000"/>
                   </a:solidFill>
@@ -5081,7 +5086,7 @@
             </a:ln>
             <a:extLst>
               <a:ext uri="{91240B29-F687-4f45-9708-019B960494DF}">
-                <a14:hiddenLine xmlns:a14="http://schemas.microsoft.com/office/drawing/2010/main" xmlns="" w="9525">
+                <a14:hiddenLine xmlns="" xmlns:a14="http://schemas.microsoft.com/office/drawing/2010/main" w="9525">
                   <a:solidFill>
                     <a:srgbClr val="000000"/>
                   </a:solidFill>
@@ -5143,7 +5148,7 @@
             </a:ln>
             <a:extLst>
               <a:ext uri="{91240B29-F687-4f45-9708-019B960494DF}">
-                <a14:hiddenLine xmlns:a14="http://schemas.microsoft.com/office/drawing/2010/main" xmlns="" w="9525">
+                <a14:hiddenLine xmlns="" xmlns:a14="http://schemas.microsoft.com/office/drawing/2010/main" w="9525">
                   <a:solidFill>
                     <a:srgbClr val="000000"/>
                   </a:solidFill>
@@ -5263,7 +5268,7 @@
             </a:ln>
             <a:extLst>
               <a:ext uri="{91240B29-F687-4f45-9708-019B960494DF}">
-                <a14:hiddenLine xmlns:a14="http://schemas.microsoft.com/office/drawing/2010/main" xmlns="" w="9525">
+                <a14:hiddenLine xmlns="" xmlns:a14="http://schemas.microsoft.com/office/drawing/2010/main" w="9525">
                   <a:solidFill>
                     <a:srgbClr val="000000"/>
                   </a:solidFill>
@@ -5331,7 +5336,7 @@
             </a:ln>
             <a:extLst>
               <a:ext uri="{91240B29-F687-4f45-9708-019B960494DF}">
-                <a14:hiddenLine xmlns:a14="http://schemas.microsoft.com/office/drawing/2010/main" xmlns="" w="9525">
+                <a14:hiddenLine xmlns="" xmlns:a14="http://schemas.microsoft.com/office/drawing/2010/main" w="9525">
                   <a:solidFill>
                     <a:srgbClr val="000000"/>
                   </a:solidFill>
@@ -5421,7 +5426,7 @@
             </a:ln>
             <a:extLst>
               <a:ext uri="{91240B29-F687-4f45-9708-019B960494DF}">
-                <a14:hiddenLine xmlns:a14="http://schemas.microsoft.com/office/drawing/2010/main" xmlns="" w="9525">
+                <a14:hiddenLine xmlns="" xmlns:a14="http://schemas.microsoft.com/office/drawing/2010/main" w="9525">
                   <a:solidFill>
                     <a:srgbClr val="000000"/>
                   </a:solidFill>
@@ -5561,7 +5566,7 @@
           <a:p>
             <a:fld id="{48A87A34-81AB-432B-8DAE-1953F412C126}" type="datetimeFigureOut">
               <a:rPr lang="en-US" dirty="0"/>
-              <a:t>9/14/2021</a:t>
+              <a:t>9/15/2021</a:t>
             </a:fld>
             <a:endParaRPr lang="en-US" dirty="0"/>
           </a:p>
@@ -5838,7 +5843,7 @@
           <a:p>
             <a:fld id="{48A87A34-81AB-432B-8DAE-1953F412C126}" type="datetimeFigureOut">
               <a:rPr lang="en-US" dirty="0"/>
-              <a:t>9/14/2021</a:t>
+              <a:t>9/15/2021</a:t>
             </a:fld>
             <a:endParaRPr lang="en-US" dirty="0"/>
           </a:p>
@@ -6044,7 +6049,7 @@
           <a:p>
             <a:fld id="{48A87A34-81AB-432B-8DAE-1953F412C126}" type="datetimeFigureOut">
               <a:rPr lang="en-US" dirty="0"/>
-              <a:t>9/14/2021</a:t>
+              <a:t>9/15/2021</a:t>
             </a:fld>
             <a:endParaRPr lang="en-US" dirty="0"/>
           </a:p>
@@ -6317,7 +6322,7 @@
           <a:p>
             <a:fld id="{48A87A34-81AB-432B-8DAE-1953F412C126}" type="datetimeFigureOut">
               <a:rPr lang="en-US" dirty="0"/>
-              <a:t>9/14/2021</a:t>
+              <a:t>9/15/2021</a:t>
             </a:fld>
             <a:endParaRPr lang="en-US" dirty="0"/>
           </a:p>
@@ -6761,7 +6766,7 @@
           <a:p>
             <a:fld id="{48A87A34-81AB-432B-8DAE-1953F412C126}" type="datetimeFigureOut">
               <a:rPr lang="en-US" dirty="0"/>
-              <a:t>9/14/2021</a:t>
+              <a:t>9/15/2021</a:t>
             </a:fld>
             <a:endParaRPr lang="en-US" dirty="0"/>
           </a:p>
@@ -7317,7 +7322,7 @@
           <a:p>
             <a:fld id="{48A87A34-81AB-432B-8DAE-1953F412C126}" type="datetimeFigureOut">
               <a:rPr lang="en-US" dirty="0"/>
-              <a:t>9/14/2021</a:t>
+              <a:t>9/15/2021</a:t>
             </a:fld>
             <a:endParaRPr lang="en-US" dirty="0"/>
           </a:p>
@@ -8047,7 +8052,7 @@
           <a:p>
             <a:fld id="{48A87A34-81AB-432B-8DAE-1953F412C126}" type="datetimeFigureOut">
               <a:rPr lang="en-US" dirty="0"/>
-              <a:t>9/14/2021</a:t>
+              <a:t>9/15/2021</a:t>
             </a:fld>
             <a:endParaRPr lang="en-US" dirty="0"/>
           </a:p>
@@ -8227,7 +8232,7 @@
           <a:p>
             <a:fld id="{48A87A34-81AB-432B-8DAE-1953F412C126}" type="datetimeFigureOut">
               <a:rPr lang="en-US" dirty="0"/>
-              <a:t>9/14/2021</a:t>
+              <a:t>9/15/2021</a:t>
             </a:fld>
             <a:endParaRPr lang="en-US" dirty="0"/>
           </a:p>
@@ -8417,7 +8422,7 @@
           <a:p>
             <a:fld id="{48A87A34-81AB-432B-8DAE-1953F412C126}" type="datetimeFigureOut">
               <a:rPr lang="en-US" dirty="0"/>
-              <a:t>9/14/2021</a:t>
+              <a:t>9/15/2021</a:t>
             </a:fld>
             <a:endParaRPr lang="en-US" dirty="0"/>
           </a:p>
@@ -9202,7 +9207,7 @@
           <a:p>
             <a:fld id="{48A87A34-81AB-432B-8DAE-1953F412C126}" type="datetimeFigureOut">
               <a:rPr lang="en-US" dirty="0"/>
-              <a:t>9/14/2021</a:t>
+              <a:t>9/15/2021</a:t>
             </a:fld>
             <a:endParaRPr lang="en-US" dirty="0"/>
           </a:p>
@@ -9462,7 +9467,7 @@
           <a:p>
             <a:fld id="{48A87A34-81AB-432B-8DAE-1953F412C126}" type="datetimeFigureOut">
               <a:rPr lang="en-US" dirty="0"/>
-              <a:t>9/14/2021</a:t>
+              <a:t>9/15/2021</a:t>
             </a:fld>
             <a:endParaRPr lang="en-US" dirty="0"/>
           </a:p>
@@ -9704,7 +9709,7 @@
           <a:p>
             <a:fld id="{48A87A34-81AB-432B-8DAE-1953F412C126}" type="datetimeFigureOut">
               <a:rPr lang="en-US" dirty="0"/>
-              <a:t>9/14/2021</a:t>
+              <a:t>9/15/2021</a:t>
             </a:fld>
             <a:endParaRPr lang="en-US" dirty="0"/>
           </a:p>
@@ -10095,7 +10100,7 @@
           <a:p>
             <a:fld id="{48A87A34-81AB-432B-8DAE-1953F412C126}" type="datetimeFigureOut">
               <a:rPr lang="en-US" dirty="0"/>
-              <a:t>9/14/2021</a:t>
+              <a:t>9/15/2021</a:t>
             </a:fld>
             <a:endParaRPr lang="en-US" dirty="0"/>
           </a:p>
@@ -10223,7 +10228,7 @@
           <a:p>
             <a:fld id="{48A87A34-81AB-432B-8DAE-1953F412C126}" type="datetimeFigureOut">
               <a:rPr lang="en-US" dirty="0"/>
-              <a:t>9/14/2021</a:t>
+              <a:t>9/15/2021</a:t>
             </a:fld>
             <a:endParaRPr lang="en-US" dirty="0"/>
           </a:p>
@@ -10328,7 +10333,7 @@
           <a:p>
             <a:fld id="{48A87A34-81AB-432B-8DAE-1953F412C126}" type="datetimeFigureOut">
               <a:rPr lang="en-US" dirty="0"/>
-              <a:t>9/14/2021</a:t>
+              <a:t>9/15/2021</a:t>
             </a:fld>
             <a:endParaRPr lang="en-US" dirty="0"/>
           </a:p>
@@ -10586,7 +10591,7 @@
           <a:p>
             <a:fld id="{48A87A34-81AB-432B-8DAE-1953F412C126}" type="datetimeFigureOut">
               <a:rPr lang="en-US" dirty="0"/>
-              <a:t>9/14/2021</a:t>
+              <a:t>9/15/2021</a:t>
             </a:fld>
             <a:endParaRPr lang="en-US" dirty="0"/>
           </a:p>
@@ -10876,7 +10881,7 @@
           <a:p>
             <a:fld id="{48A87A34-81AB-432B-8DAE-1953F412C126}" type="datetimeFigureOut">
               <a:rPr lang="en-US" dirty="0"/>
-              <a:t>9/14/2021</a:t>
+              <a:t>9/15/2021</a:t>
             </a:fld>
             <a:endParaRPr lang="en-US" dirty="0"/>
           </a:p>
@@ -11002,7 +11007,7 @@
           <a:noFill/>
           <a:extLst>
             <a:ext uri="{909E8E84-426E-40dd-AFC4-6F175D3DCCD1}">
-              <a14:hiddenFill xmlns:a14="http://schemas.microsoft.com/office/drawing/2010/main" xmlns="">
+              <a14:hiddenFill xmlns="" xmlns:a14="http://schemas.microsoft.com/office/drawing/2010/main">
                 <a:solidFill>
                   <a:srgbClr val="FFFFFF"/>
                 </a:solidFill>
@@ -11076,7 +11081,7 @@
               </a:ln>
               <a:extLst>
                 <a:ext uri="{91240B29-F687-4f45-9708-019B960494DF}">
-                  <a14:hiddenLine xmlns:a14="http://schemas.microsoft.com/office/drawing/2010/main" xmlns="" w="9525">
+                  <a14:hiddenLine xmlns="" xmlns:a14="http://schemas.microsoft.com/office/drawing/2010/main" w="9525">
                     <a:solidFill>
                       <a:srgbClr val="000000"/>
                     </a:solidFill>
@@ -11166,7 +11171,7 @@
               </a:ln>
               <a:extLst>
                 <a:ext uri="{91240B29-F687-4f45-9708-019B960494DF}">
-                  <a14:hiddenLine xmlns:a14="http://schemas.microsoft.com/office/drawing/2010/main" xmlns="" w="9525">
+                  <a14:hiddenLine xmlns="" xmlns:a14="http://schemas.microsoft.com/office/drawing/2010/main" w="9525">
                     <a:solidFill>
                       <a:srgbClr val="000000"/>
                     </a:solidFill>
@@ -11256,7 +11261,7 @@
               </a:ln>
               <a:extLst>
                 <a:ext uri="{91240B29-F687-4f45-9708-019B960494DF}">
-                  <a14:hiddenLine xmlns:a14="http://schemas.microsoft.com/office/drawing/2010/main" xmlns="" w="9525">
+                  <a14:hiddenLine xmlns="" xmlns:a14="http://schemas.microsoft.com/office/drawing/2010/main" w="9525">
                     <a:solidFill>
                       <a:srgbClr val="000000"/>
                     </a:solidFill>
@@ -11318,7 +11323,7 @@
               </a:ln>
               <a:extLst>
                 <a:ext uri="{91240B29-F687-4f45-9708-019B960494DF}">
-                  <a14:hiddenLine xmlns:a14="http://schemas.microsoft.com/office/drawing/2010/main" xmlns="" w="9525">
+                  <a14:hiddenLine xmlns="" xmlns:a14="http://schemas.microsoft.com/office/drawing/2010/main" w="9525">
                     <a:solidFill>
                       <a:srgbClr val="000000"/>
                     </a:solidFill>
@@ -11408,7 +11413,7 @@
               </a:ln>
               <a:extLst>
                 <a:ext uri="{91240B29-F687-4f45-9708-019B960494DF}">
-                  <a14:hiddenLine xmlns:a14="http://schemas.microsoft.com/office/drawing/2010/main" xmlns="" w="9525">
+                  <a14:hiddenLine xmlns="" xmlns:a14="http://schemas.microsoft.com/office/drawing/2010/main" w="9525">
                     <a:solidFill>
                       <a:srgbClr val="000000"/>
                     </a:solidFill>
@@ -11470,7 +11475,7 @@
               </a:ln>
               <a:extLst>
                 <a:ext uri="{91240B29-F687-4f45-9708-019B960494DF}">
-                  <a14:hiddenLine xmlns:a14="http://schemas.microsoft.com/office/drawing/2010/main" xmlns="" w="9525">
+                  <a14:hiddenLine xmlns="" xmlns:a14="http://schemas.microsoft.com/office/drawing/2010/main" w="9525">
                     <a:solidFill>
                       <a:srgbClr val="000000"/>
                     </a:solidFill>
@@ -11532,7 +11537,7 @@
               </a:ln>
               <a:extLst>
                 <a:ext uri="{91240B29-F687-4f45-9708-019B960494DF}">
-                  <a14:hiddenLine xmlns:a14="http://schemas.microsoft.com/office/drawing/2010/main" xmlns="" w="9525">
+                  <a14:hiddenLine xmlns="" xmlns:a14="http://schemas.microsoft.com/office/drawing/2010/main" w="9525">
                     <a:solidFill>
                       <a:srgbClr val="000000"/>
                     </a:solidFill>
@@ -11622,7 +11627,7 @@
               </a:ln>
               <a:extLst>
                 <a:ext uri="{91240B29-F687-4f45-9708-019B960494DF}">
-                  <a14:hiddenLine xmlns:a14="http://schemas.microsoft.com/office/drawing/2010/main" xmlns="" w="9525">
+                  <a14:hiddenLine xmlns="" xmlns:a14="http://schemas.microsoft.com/office/drawing/2010/main" w="9525">
                     <a:solidFill>
                       <a:srgbClr val="000000"/>
                     </a:solidFill>
@@ -11712,7 +11717,7 @@
               </a:ln>
               <a:extLst>
                 <a:ext uri="{91240B29-F687-4f45-9708-019B960494DF}">
-                  <a14:hiddenLine xmlns:a14="http://schemas.microsoft.com/office/drawing/2010/main" xmlns="" w="9525">
+                  <a14:hiddenLine xmlns="" xmlns:a14="http://schemas.microsoft.com/office/drawing/2010/main" w="9525">
                     <a:solidFill>
                       <a:srgbClr val="000000"/>
                     </a:solidFill>
@@ -11774,7 +11779,7 @@
               </a:ln>
               <a:extLst>
                 <a:ext uri="{91240B29-F687-4f45-9708-019B960494DF}">
-                  <a14:hiddenLine xmlns:a14="http://schemas.microsoft.com/office/drawing/2010/main" xmlns="" w="9525">
+                  <a14:hiddenLine xmlns="" xmlns:a14="http://schemas.microsoft.com/office/drawing/2010/main" w="9525">
                     <a:solidFill>
                       <a:srgbClr val="000000"/>
                     </a:solidFill>
@@ -11884,7 +11889,7 @@
               </a:ln>
               <a:extLst>
                 <a:ext uri="{91240B29-F687-4f45-9708-019B960494DF}">
-                  <a14:hiddenLine xmlns:a14="http://schemas.microsoft.com/office/drawing/2010/main" xmlns="" w="9525">
+                  <a14:hiddenLine xmlns="" xmlns:a14="http://schemas.microsoft.com/office/drawing/2010/main" w="9525">
                     <a:solidFill>
                       <a:srgbClr val="000000"/>
                     </a:solidFill>
@@ -11968,7 +11973,7 @@
               </a:ln>
               <a:extLst>
                 <a:ext uri="{91240B29-F687-4f45-9708-019B960494DF}">
-                  <a14:hiddenLine xmlns:a14="http://schemas.microsoft.com/office/drawing/2010/main" xmlns="" w="9525">
+                  <a14:hiddenLine xmlns="" xmlns:a14="http://schemas.microsoft.com/office/drawing/2010/main" w="9525">
                     <a:solidFill>
                       <a:srgbClr val="000000"/>
                     </a:solidFill>
@@ -12030,7 +12035,7 @@
               </a:ln>
               <a:extLst>
                 <a:ext uri="{91240B29-F687-4f45-9708-019B960494DF}">
-                  <a14:hiddenLine xmlns:a14="http://schemas.microsoft.com/office/drawing/2010/main" xmlns="" w="9525">
+                  <a14:hiddenLine xmlns="" xmlns:a14="http://schemas.microsoft.com/office/drawing/2010/main" w="9525">
                     <a:solidFill>
                       <a:srgbClr val="000000"/>
                     </a:solidFill>
@@ -12092,7 +12097,7 @@
               </a:ln>
               <a:extLst>
                 <a:ext uri="{91240B29-F687-4f45-9708-019B960494DF}">
-                  <a14:hiddenLine xmlns:a14="http://schemas.microsoft.com/office/drawing/2010/main" xmlns="" w="9525">
+                  <a14:hiddenLine xmlns="" xmlns:a14="http://schemas.microsoft.com/office/drawing/2010/main" w="9525">
                     <a:solidFill>
                       <a:srgbClr val="000000"/>
                     </a:solidFill>
@@ -12182,7 +12187,7 @@
               </a:ln>
               <a:extLst>
                 <a:ext uri="{91240B29-F687-4f45-9708-019B960494DF}">
-                  <a14:hiddenLine xmlns:a14="http://schemas.microsoft.com/office/drawing/2010/main" xmlns="" w="9525">
+                  <a14:hiddenLine xmlns="" xmlns:a14="http://schemas.microsoft.com/office/drawing/2010/main" w="9525">
                     <a:solidFill>
                       <a:srgbClr val="000000"/>
                     </a:solidFill>
@@ -12216,7 +12221,7 @@
               </a:ln>
               <a:extLst>
                 <a:ext uri="{91240B29-F687-4f45-9708-019B960494DF}">
-                  <a14:hiddenLine xmlns:a14="http://schemas.microsoft.com/office/drawing/2010/main" xmlns="" w="9525">
+                  <a14:hiddenLine xmlns="" xmlns:a14="http://schemas.microsoft.com/office/drawing/2010/main" w="9525">
                     <a:solidFill>
                       <a:srgbClr val="000000"/>
                     </a:solidFill>
@@ -12281,7 +12286,7 @@
               </a:ln>
               <a:extLst>
                 <a:ext uri="{91240B29-F687-4f45-9708-019B960494DF}">
-                  <a14:hiddenLine xmlns:a14="http://schemas.microsoft.com/office/drawing/2010/main" xmlns="" w="9525">
+                  <a14:hiddenLine xmlns="" xmlns:a14="http://schemas.microsoft.com/office/drawing/2010/main" w="9525">
                     <a:solidFill>
                       <a:srgbClr val="000000"/>
                     </a:solidFill>
@@ -12371,7 +12376,7 @@
               </a:ln>
               <a:extLst>
                 <a:ext uri="{91240B29-F687-4f45-9708-019B960494DF}">
-                  <a14:hiddenLine xmlns:a14="http://schemas.microsoft.com/office/drawing/2010/main" xmlns="" w="9525">
+                  <a14:hiddenLine xmlns="" xmlns:a14="http://schemas.microsoft.com/office/drawing/2010/main" w="9525">
                     <a:solidFill>
                       <a:srgbClr val="000000"/>
                     </a:solidFill>
@@ -12433,7 +12438,7 @@
               </a:ln>
               <a:extLst>
                 <a:ext uri="{91240B29-F687-4f45-9708-019B960494DF}">
-                  <a14:hiddenLine xmlns:a14="http://schemas.microsoft.com/office/drawing/2010/main" xmlns="" w="9525">
+                  <a14:hiddenLine xmlns="" xmlns:a14="http://schemas.microsoft.com/office/drawing/2010/main" w="9525">
                     <a:solidFill>
                       <a:srgbClr val="000000"/>
                     </a:solidFill>
@@ -12523,7 +12528,7 @@
               </a:ln>
               <a:extLst>
                 <a:ext uri="{91240B29-F687-4f45-9708-019B960494DF}">
-                  <a14:hiddenLine xmlns:a14="http://schemas.microsoft.com/office/drawing/2010/main" xmlns="" w="9525">
+                  <a14:hiddenLine xmlns="" xmlns:a14="http://schemas.microsoft.com/office/drawing/2010/main" w="9525">
                     <a:solidFill>
                       <a:srgbClr val="000000"/>
                     </a:solidFill>
@@ -12588,7 +12593,7 @@
               </a:ln>
               <a:extLst>
                 <a:ext uri="{91240B29-F687-4f45-9708-019B960494DF}">
-                  <a14:hiddenLine xmlns:a14="http://schemas.microsoft.com/office/drawing/2010/main" xmlns="" w="9525">
+                  <a14:hiddenLine xmlns="" xmlns:a14="http://schemas.microsoft.com/office/drawing/2010/main" w="9525">
                     <a:solidFill>
                       <a:srgbClr val="000000"/>
                     </a:solidFill>
@@ -12650,7 +12655,7 @@
               </a:ln>
               <a:extLst>
                 <a:ext uri="{91240B29-F687-4f45-9708-019B960494DF}">
-                  <a14:hiddenLine xmlns:a14="http://schemas.microsoft.com/office/drawing/2010/main" xmlns="" w="9525">
+                  <a14:hiddenLine xmlns="" xmlns:a14="http://schemas.microsoft.com/office/drawing/2010/main" w="9525">
                     <a:solidFill>
                       <a:srgbClr val="000000"/>
                     </a:solidFill>
@@ -12740,7 +12745,7 @@
               </a:ln>
               <a:extLst>
                 <a:ext uri="{91240B29-F687-4f45-9708-019B960494DF}">
-                  <a14:hiddenLine xmlns:a14="http://schemas.microsoft.com/office/drawing/2010/main" xmlns="" w="9525">
+                  <a14:hiddenLine xmlns="" xmlns:a14="http://schemas.microsoft.com/office/drawing/2010/main" w="9525">
                     <a:solidFill>
                       <a:srgbClr val="000000"/>
                     </a:solidFill>
@@ -12830,7 +12835,7 @@
               </a:ln>
               <a:extLst>
                 <a:ext uri="{91240B29-F687-4f45-9708-019B960494DF}">
-                  <a14:hiddenLine xmlns:a14="http://schemas.microsoft.com/office/drawing/2010/main" xmlns="" w="9525">
+                  <a14:hiddenLine xmlns="" xmlns:a14="http://schemas.microsoft.com/office/drawing/2010/main" w="9525">
                     <a:solidFill>
                       <a:srgbClr val="000000"/>
                     </a:solidFill>
@@ -12895,7 +12900,7 @@
               </a:ln>
               <a:extLst>
                 <a:ext uri="{91240B29-F687-4f45-9708-019B960494DF}">
-                  <a14:hiddenLine xmlns:a14="http://schemas.microsoft.com/office/drawing/2010/main" xmlns="" w="9525">
+                  <a14:hiddenLine xmlns="" xmlns:a14="http://schemas.microsoft.com/office/drawing/2010/main" w="9525">
                     <a:solidFill>
                       <a:srgbClr val="000000"/>
                     </a:solidFill>
@@ -13015,7 +13020,7 @@
               </a:ln>
               <a:extLst>
                 <a:ext uri="{91240B29-F687-4f45-9708-019B960494DF}">
-                  <a14:hiddenLine xmlns:a14="http://schemas.microsoft.com/office/drawing/2010/main" xmlns="" w="9525">
+                  <a14:hiddenLine xmlns="" xmlns:a14="http://schemas.microsoft.com/office/drawing/2010/main" w="9525">
                     <a:solidFill>
                       <a:srgbClr val="000000"/>
                     </a:solidFill>
@@ -13113,7 +13118,7 @@
               </a:ln>
               <a:extLst>
                 <a:ext uri="{91240B29-F687-4f45-9708-019B960494DF}">
-                  <a14:hiddenLine xmlns:a14="http://schemas.microsoft.com/office/drawing/2010/main" xmlns="" w="9525">
+                  <a14:hiddenLine xmlns="" xmlns:a14="http://schemas.microsoft.com/office/drawing/2010/main" w="9525">
                     <a:solidFill>
                       <a:srgbClr val="000000"/>
                     </a:solidFill>
@@ -13228,7 +13233,7 @@
               </a:ln>
               <a:extLst>
                 <a:ext uri="{91240B29-F687-4f45-9708-019B960494DF}">
-                  <a14:hiddenLine xmlns:a14="http://schemas.microsoft.com/office/drawing/2010/main" xmlns="" w="9525">
+                  <a14:hiddenLine xmlns="" xmlns:a14="http://schemas.microsoft.com/office/drawing/2010/main" w="9525">
                     <a:solidFill>
                       <a:srgbClr val="000000"/>
                     </a:solidFill>
@@ -13318,7 +13323,7 @@
               </a:ln>
               <a:extLst>
                 <a:ext uri="{91240B29-F687-4f45-9708-019B960494DF}">
-                  <a14:hiddenLine xmlns:a14="http://schemas.microsoft.com/office/drawing/2010/main" xmlns="" w="9525">
+                  <a14:hiddenLine xmlns="" xmlns:a14="http://schemas.microsoft.com/office/drawing/2010/main" w="9525">
                     <a:solidFill>
                       <a:srgbClr val="000000"/>
                     </a:solidFill>
@@ -13383,7 +13388,7 @@
               </a:ln>
               <a:extLst>
                 <a:ext uri="{91240B29-F687-4f45-9708-019B960494DF}">
-                  <a14:hiddenLine xmlns:a14="http://schemas.microsoft.com/office/drawing/2010/main" xmlns="" w="9525">
+                  <a14:hiddenLine xmlns="" xmlns:a14="http://schemas.microsoft.com/office/drawing/2010/main" w="9525">
                     <a:solidFill>
                       <a:srgbClr val="000000"/>
                     </a:solidFill>
@@ -13473,7 +13478,7 @@
               </a:ln>
               <a:extLst>
                 <a:ext uri="{91240B29-F687-4f45-9708-019B960494DF}">
-                  <a14:hiddenLine xmlns:a14="http://schemas.microsoft.com/office/drawing/2010/main" xmlns="" w="9525">
+                  <a14:hiddenLine xmlns="" xmlns:a14="http://schemas.microsoft.com/office/drawing/2010/main" w="9525">
                     <a:solidFill>
                       <a:srgbClr val="000000"/>
                     </a:solidFill>
@@ -13541,7 +13546,7 @@
               </a:ln>
               <a:extLst>
                 <a:ext uri="{91240B29-F687-4f45-9708-019B960494DF}">
-                  <a14:hiddenLine xmlns:a14="http://schemas.microsoft.com/office/drawing/2010/main" xmlns="" w="9525">
+                  <a14:hiddenLine xmlns="" xmlns:a14="http://schemas.microsoft.com/office/drawing/2010/main" w="9525">
                     <a:solidFill>
                       <a:srgbClr val="000000"/>
                     </a:solidFill>
@@ -13631,7 +13636,7 @@
               </a:ln>
               <a:extLst>
                 <a:ext uri="{91240B29-F687-4f45-9708-019B960494DF}">
-                  <a14:hiddenLine xmlns:a14="http://schemas.microsoft.com/office/drawing/2010/main" xmlns="" w="9525">
+                  <a14:hiddenLine xmlns="" xmlns:a14="http://schemas.microsoft.com/office/drawing/2010/main" w="9525">
                     <a:solidFill>
                       <a:srgbClr val="000000"/>
                     </a:solidFill>
@@ -13699,7 +13704,7 @@
               </a:ln>
               <a:extLst>
                 <a:ext uri="{91240B29-F687-4f45-9708-019B960494DF}">
-                  <a14:hiddenLine xmlns:a14="http://schemas.microsoft.com/office/drawing/2010/main" xmlns="" w="9525">
+                  <a14:hiddenLine xmlns="" xmlns:a14="http://schemas.microsoft.com/office/drawing/2010/main" w="9525">
                     <a:solidFill>
                       <a:srgbClr val="000000"/>
                     </a:solidFill>
@@ -13789,7 +13794,7 @@
               </a:ln>
               <a:extLst>
                 <a:ext uri="{91240B29-F687-4f45-9708-019B960494DF}">
-                  <a14:hiddenLine xmlns:a14="http://schemas.microsoft.com/office/drawing/2010/main" xmlns="" w="9525">
+                  <a14:hiddenLine xmlns="" xmlns:a14="http://schemas.microsoft.com/office/drawing/2010/main" w="9525">
                     <a:solidFill>
                       <a:srgbClr val="000000"/>
                     </a:solidFill>
@@ -13823,7 +13828,7 @@
               </a:ln>
               <a:extLst>
                 <a:ext uri="{91240B29-F687-4f45-9708-019B960494DF}">
-                  <a14:hiddenLine xmlns:a14="http://schemas.microsoft.com/office/drawing/2010/main" xmlns="" w="9525">
+                  <a14:hiddenLine xmlns="" xmlns:a14="http://schemas.microsoft.com/office/drawing/2010/main" w="9525">
                     <a:solidFill>
                       <a:srgbClr val="000000"/>
                     </a:solidFill>
@@ -13964,7 +13969,7 @@
             <a:fld id="{48A87A34-81AB-432B-8DAE-1953F412C126}" type="datetimeFigureOut">
               <a:rPr lang="en-US" dirty="0"/>
               <a:pPr/>
-              <a:t>9/14/2021</a:t>
+              <a:t>9/15/2021</a:t>
             </a:fld>
             <a:endParaRPr lang="en-US" dirty="0"/>
           </a:p>
@@ -14496,6 +14501,14 @@
               <a:rPr lang="en-US" sz="1800" dirty="0" err="1"/>
               <a:t>mcswain</a:t>
             </a:r>
+            <a:endParaRPr lang="en-US" sz="1800" dirty="0"/>
+          </a:p>
+          <a:p>
+            <a:pPr algn="ctr"/>
+            <a:r>
+              <a:rPr lang="en-US" sz="1800" dirty="0"/>
+              <a:t>Angelo Nunez</a:t>
+            </a:r>
             <a:br>
               <a:rPr lang="en-US" dirty="0"/>
             </a:br>
@@ -14715,10 +14728,7 @@
               <a:rPr lang="en" dirty="0"/>
               <a:t>User story – </a:t>
             </a:r>
-            <a:r>
-              <a:rPr lang="en-US" dirty="0"/>
-              <a:t>Our project team started out with 4 members, but we quickly dropped too 2 members. We had to scale back our content just to get project minimum requirements met. </a:t>
-            </a:r>
+            <a:endParaRPr lang="en-US" dirty="0"/>
           </a:p>
           <a:p>
             <a:pPr lvl="1" indent="-342900">
@@ -14730,7 +14740,7 @@
             </a:pPr>
             <a:r>
               <a:rPr lang="en-US" dirty="0"/>
-              <a:t>This website started out as an adopt a pet opportunity but that proved to be to much development for a team of 2.</a:t>
+              <a:t>This website started out as an adopt a pet opportunity but that proved to be to much development as our team resources where limited.</a:t>
             </a:r>
           </a:p>
           <a:p>
@@ -14743,7 +14753,20 @@
             </a:pPr>
             <a:r>
               <a:rPr lang="en-US" dirty="0"/>
-              <a:t>We feel like this website has a lot of potential and hopefully we can add the adopt a pet option in the near future.</a:t>
+              <a:t>We decided to provide the user facts about cats and dogs, also provided the user the opportunity to submit their own facts.</a:t>
+            </a:r>
+          </a:p>
+          <a:p>
+            <a:pPr lvl="1" indent="-342900">
+              <a:spcBef>
+                <a:spcPts val="0"/>
+              </a:spcBef>
+              <a:buSzPts val="1800"/>
+              <a:buChar char="●"/>
+            </a:pPr>
+            <a:r>
+              <a:rPr lang="en-US" dirty="0"/>
+              <a:t>We feel like this website has a lot of potential and hopefully we can add the adopt a pet option later.</a:t>
             </a:r>
             <a:endParaRPr dirty="0"/>
           </a:p>
@@ -15071,10 +15094,162 @@
               <a:buNone/>
             </a:pPr>
             <a:r>
-              <a:rPr lang="en"/>
+              <a:rPr lang="en" dirty="0"/>
               <a:t>Demo</a:t>
             </a:r>
-            <a:endParaRPr/>
+            <a:endParaRPr dirty="0"/>
+          </a:p>
+        </p:txBody>
+      </p:sp>
+      <p:sp>
+        <p:nvSpPr>
+          <p:cNvPr id="3" name="Google Shape;77;p17">
+            <a:extLst>
+              <a:ext uri="{FF2B5EF4-FFF2-40B4-BE49-F238E27FC236}">
+                <a16:creationId xmlns:a16="http://schemas.microsoft.com/office/drawing/2014/main" id="{483D0121-645A-4649-B210-DC8520F4403B}"/>
+              </a:ext>
+            </a:extLst>
+          </p:cNvPr>
+          <p:cNvSpPr txBox="1">
+            <a:spLocks/>
+          </p:cNvSpPr>
+          <p:nvPr/>
+        </p:nvSpPr>
+        <p:spPr>
+          <a:xfrm>
+            <a:off x="311700" y="2907308"/>
+            <a:ext cx="8520600" cy="841800"/>
+          </a:xfrm>
+          <a:prstGeom prst="rect">
+            <a:avLst/>
+          </a:prstGeom>
+        </p:spPr>
+        <p:txBody>
+          <a:bodyPr spcFirstLastPara="1" vert="horz" wrap="square" lIns="91425" tIns="91425" rIns="91425" bIns="91425" rtlCol="0" anchor="ctr" anchorCtr="0">
+            <a:noAutofit/>
+          </a:bodyPr>
+          <a:lstStyle>
+            <a:lvl1pPr lvl="0" algn="ctr" defTabSz="685800" rtl="0" eaLnBrk="1" latinLnBrk="0" hangingPunct="1">
+              <a:lnSpc>
+                <a:spcPct val="90000"/>
+              </a:lnSpc>
+              <a:spcBef>
+                <a:spcPts val="0"/>
+              </a:spcBef>
+              <a:spcAft>
+                <a:spcPts val="0"/>
+              </a:spcAft>
+              <a:buSzPts val="3600"/>
+              <a:buNone/>
+              <a:defRPr sz="3600" kern="1200" cap="all" baseline="0">
+                <a:solidFill>
+                  <a:schemeClr val="tx1"/>
+                </a:solidFill>
+                <a:latin typeface="+mj-lt"/>
+                <a:ea typeface="+mj-ea"/>
+                <a:cs typeface="+mj-cs"/>
+              </a:defRPr>
+            </a:lvl1pPr>
+            <a:lvl2pPr lvl="1" algn="ctr">
+              <a:spcBef>
+                <a:spcPts val="0"/>
+              </a:spcBef>
+              <a:spcAft>
+                <a:spcPts val="0"/>
+              </a:spcAft>
+              <a:buSzPts val="3600"/>
+              <a:buNone/>
+              <a:defRPr sz="3600"/>
+            </a:lvl2pPr>
+            <a:lvl3pPr lvl="2" algn="ctr">
+              <a:spcBef>
+                <a:spcPts val="0"/>
+              </a:spcBef>
+              <a:spcAft>
+                <a:spcPts val="0"/>
+              </a:spcAft>
+              <a:buSzPts val="3600"/>
+              <a:buNone/>
+              <a:defRPr sz="3600"/>
+            </a:lvl3pPr>
+            <a:lvl4pPr lvl="3" algn="ctr">
+              <a:spcBef>
+                <a:spcPts val="0"/>
+              </a:spcBef>
+              <a:spcAft>
+                <a:spcPts val="0"/>
+              </a:spcAft>
+              <a:buSzPts val="3600"/>
+              <a:buNone/>
+              <a:defRPr sz="3600"/>
+            </a:lvl4pPr>
+            <a:lvl5pPr lvl="4" algn="ctr">
+              <a:spcBef>
+                <a:spcPts val="0"/>
+              </a:spcBef>
+              <a:spcAft>
+                <a:spcPts val="0"/>
+              </a:spcAft>
+              <a:buSzPts val="3600"/>
+              <a:buNone/>
+              <a:defRPr sz="3600"/>
+            </a:lvl5pPr>
+            <a:lvl6pPr lvl="5" algn="ctr">
+              <a:spcBef>
+                <a:spcPts val="0"/>
+              </a:spcBef>
+              <a:spcAft>
+                <a:spcPts val="0"/>
+              </a:spcAft>
+              <a:buSzPts val="3600"/>
+              <a:buNone/>
+              <a:defRPr sz="3600"/>
+            </a:lvl6pPr>
+            <a:lvl7pPr lvl="6" algn="ctr">
+              <a:spcBef>
+                <a:spcPts val="0"/>
+              </a:spcBef>
+              <a:spcAft>
+                <a:spcPts val="0"/>
+              </a:spcAft>
+              <a:buSzPts val="3600"/>
+              <a:buNone/>
+              <a:defRPr sz="3600"/>
+            </a:lvl7pPr>
+            <a:lvl8pPr lvl="7" algn="ctr">
+              <a:spcBef>
+                <a:spcPts val="0"/>
+              </a:spcBef>
+              <a:spcAft>
+                <a:spcPts val="0"/>
+              </a:spcAft>
+              <a:buSzPts val="3600"/>
+              <a:buNone/>
+              <a:defRPr sz="3600"/>
+            </a:lvl8pPr>
+            <a:lvl9pPr lvl="8" algn="ctr">
+              <a:spcBef>
+                <a:spcPts val="0"/>
+              </a:spcBef>
+              <a:spcAft>
+                <a:spcPts val="0"/>
+              </a:spcAft>
+              <a:buSzPts val="3600"/>
+              <a:buNone/>
+              <a:defRPr sz="3600"/>
+            </a:lvl9pPr>
+          </a:lstStyle>
+          <a:p>
+            <a:pPr marL="114300" lvl="1">
+              <a:buSzPts val="1800"/>
+            </a:pPr>
+            <a:r>
+              <a:rPr lang="en-US" sz="2000" dirty="0">
+                <a:hlinkClick r:id="rId3"/>
+              </a:rPr>
+              <a:t>https://mcswajl.github.io/project-1/</a:t>
+            </a:r>
+            <a:endParaRPr lang="en" sz="2000" dirty="0"/>
           </a:p>
         </p:txBody>
       </p:sp>
@@ -15163,28 +15338,51 @@
           <a:lstStyle/>
           <a:p>
             <a:pPr marL="285750" indent="-285750">
+              <a:lnSpc>
+                <a:spcPct val="100000"/>
+              </a:lnSpc>
               <a:spcAft>
                 <a:spcPts val="1600"/>
               </a:spcAft>
             </a:pPr>
             <a:r>
               <a:rPr lang="en-US" dirty="0"/>
-              <a:t>We feel like this website has a lot of potential and hopefully we can add the adopt a pet option soon.</a:t>
+              <a:t>We have talked about adding the adopt a pet option back to this website.</a:t>
             </a:r>
           </a:p>
           <a:p>
             <a:pPr marL="742950" lvl="1" indent="-285750">
+              <a:lnSpc>
+                <a:spcPct val="100000"/>
+              </a:lnSpc>
               <a:spcAft>
                 <a:spcPts val="1600"/>
               </a:spcAft>
             </a:pPr>
             <a:r>
               <a:rPr lang="en-US" dirty="0"/>
-              <a:t>Skeleton offers </a:t>
+              <a:t>Our vision was to provide the user with facts and if they found a cat or dog breed that interested them, we will add a new form.</a:t>
             </a:r>
           </a:p>
           <a:p>
+            <a:pPr marL="742950" lvl="1" indent="-285750">
+              <a:lnSpc>
+                <a:spcPct val="100000"/>
+              </a:lnSpc>
+              <a:spcAft>
+                <a:spcPts val="1600"/>
+              </a:spcAft>
+            </a:pPr>
+            <a:r>
+              <a:rPr lang="en-US" dirty="0"/>
+              <a:t>This new form will provide the user a way to search for their breed using a search feature that is linked to an active pet adoption website using an API service.</a:t>
+            </a:r>
+          </a:p>
+          <a:p>
             <a:pPr marL="0" lvl="0" indent="0" algn="l" rtl="0">
+              <a:lnSpc>
+                <a:spcPct val="100000"/>
+              </a:lnSpc>
               <a:spcBef>
                 <a:spcPts val="0"/>
               </a:spcBef>
@@ -15304,6 +15502,22 @@
               <a:buSzPts val="1800"/>
               <a:buChar char="●"/>
             </a:pPr>
+            <a:r>
+              <a:rPr lang="en-US" dirty="0">
+                <a:hlinkClick r:id="rId3"/>
+              </a:rPr>
+              <a:t>https://mcswajl.github.io/project-1/</a:t>
+            </a:r>
+            <a:endParaRPr lang="en" dirty="0"/>
+          </a:p>
+          <a:p>
+            <a:pPr lvl="1" indent="-342900">
+              <a:spcBef>
+                <a:spcPts val="0"/>
+              </a:spcBef>
+              <a:buSzPts val="1800"/>
+              <a:buChar char="●"/>
+            </a:pPr>
             <a:endParaRPr dirty="0"/>
           </a:p>
           <a:p>
@@ -15336,7 +15550,7 @@
             </a:pPr>
             <a:r>
               <a:rPr lang="en-US" dirty="0">
-                <a:hlinkClick r:id="rId3"/>
+                <a:hlinkClick r:id="rId4"/>
               </a:rPr>
               <a:t>mcswajl/project-1 (github.com)</a:t>
             </a:r>

</xml_diff>